<commit_message>
more points added to city map
</commit_message>
<xml_diff>
--- a/examples/utqiavik/labels/labels.pptx
+++ b/examples/utqiavik/labels/labels.pptx
@@ -7,6 +7,7 @@
   <p:sldIdLst>
     <p:sldId id="256" r:id="rId2"/>
     <p:sldId id="257" r:id="rId3"/>
+    <p:sldId id="258" r:id="rId4"/>
   </p:sldIdLst>
   <p:sldSz cx="12192000" cy="6858000"/>
   <p:notesSz cx="6858000" cy="9144000"/>
@@ -105,6 +106,11 @@
       </a:defRPr>
     </a:lvl9pPr>
   </p:defaultTextStyle>
+  <p:extLst>
+    <p:ext uri="{EFAFB233-063F-42B5-8137-9DF3F51BA10A}">
+      <p15:sldGuideLst xmlns:p15="http://schemas.microsoft.com/office/powerpoint/2012/main"/>
+    </p:ext>
+  </p:extLst>
 </p:presentation>
 </file>
 
@@ -255,7 +261,7 @@
           <a:p>
             <a:fld id="{75A10633-11DF-E949-A1EF-F550A4FAE699}" type="datetimeFigureOut">
               <a:rPr lang="en-US" smtClean="0"/>
-              <a:t>1/10/24</a:t>
+              <a:t>1/11/24</a:t>
             </a:fld>
             <a:endParaRPr lang="en-US"/>
           </a:p>
@@ -453,7 +459,7 @@
           <a:p>
             <a:fld id="{75A10633-11DF-E949-A1EF-F550A4FAE699}" type="datetimeFigureOut">
               <a:rPr lang="en-US" smtClean="0"/>
-              <a:t>1/10/24</a:t>
+              <a:t>1/11/24</a:t>
             </a:fld>
             <a:endParaRPr lang="en-US"/>
           </a:p>
@@ -661,7 +667,7 @@
           <a:p>
             <a:fld id="{75A10633-11DF-E949-A1EF-F550A4FAE699}" type="datetimeFigureOut">
               <a:rPr lang="en-US" smtClean="0"/>
-              <a:t>1/10/24</a:t>
+              <a:t>1/11/24</a:t>
             </a:fld>
             <a:endParaRPr lang="en-US"/>
           </a:p>
@@ -859,7 +865,7 @@
           <a:p>
             <a:fld id="{75A10633-11DF-E949-A1EF-F550A4FAE699}" type="datetimeFigureOut">
               <a:rPr lang="en-US" smtClean="0"/>
-              <a:t>1/10/24</a:t>
+              <a:t>1/11/24</a:t>
             </a:fld>
             <a:endParaRPr lang="en-US"/>
           </a:p>
@@ -1134,7 +1140,7 @@
           <a:p>
             <a:fld id="{75A10633-11DF-E949-A1EF-F550A4FAE699}" type="datetimeFigureOut">
               <a:rPr lang="en-US" smtClean="0"/>
-              <a:t>1/10/24</a:t>
+              <a:t>1/11/24</a:t>
             </a:fld>
             <a:endParaRPr lang="en-US"/>
           </a:p>
@@ -1399,7 +1405,7 @@
           <a:p>
             <a:fld id="{75A10633-11DF-E949-A1EF-F550A4FAE699}" type="datetimeFigureOut">
               <a:rPr lang="en-US" smtClean="0"/>
-              <a:t>1/10/24</a:t>
+              <a:t>1/11/24</a:t>
             </a:fld>
             <a:endParaRPr lang="en-US"/>
           </a:p>
@@ -1811,7 +1817,7 @@
           <a:p>
             <a:fld id="{75A10633-11DF-E949-A1EF-F550A4FAE699}" type="datetimeFigureOut">
               <a:rPr lang="en-US" smtClean="0"/>
-              <a:t>1/10/24</a:t>
+              <a:t>1/11/24</a:t>
             </a:fld>
             <a:endParaRPr lang="en-US"/>
           </a:p>
@@ -1952,7 +1958,7 @@
           <a:p>
             <a:fld id="{75A10633-11DF-E949-A1EF-F550A4FAE699}" type="datetimeFigureOut">
               <a:rPr lang="en-US" smtClean="0"/>
-              <a:t>1/10/24</a:t>
+              <a:t>1/11/24</a:t>
             </a:fld>
             <a:endParaRPr lang="en-US"/>
           </a:p>
@@ -2065,7 +2071,7 @@
           <a:p>
             <a:fld id="{75A10633-11DF-E949-A1EF-F550A4FAE699}" type="datetimeFigureOut">
               <a:rPr lang="en-US" smtClean="0"/>
-              <a:t>1/10/24</a:t>
+              <a:t>1/11/24</a:t>
             </a:fld>
             <a:endParaRPr lang="en-US"/>
           </a:p>
@@ -2376,7 +2382,7 @@
           <a:p>
             <a:fld id="{75A10633-11DF-E949-A1EF-F550A4FAE699}" type="datetimeFigureOut">
               <a:rPr lang="en-US" smtClean="0"/>
-              <a:t>1/10/24</a:t>
+              <a:t>1/11/24</a:t>
             </a:fld>
             <a:endParaRPr lang="en-US"/>
           </a:p>
@@ -2664,7 +2670,7 @@
           <a:p>
             <a:fld id="{75A10633-11DF-E949-A1EF-F550A4FAE699}" type="datetimeFigureOut">
               <a:rPr lang="en-US" smtClean="0"/>
-              <a:t>1/10/24</a:t>
+              <a:t>1/11/24</a:t>
             </a:fld>
             <a:endParaRPr lang="en-US"/>
           </a:p>
@@ -2905,7 +2911,7 @@
           <a:p>
             <a:fld id="{75A10633-11DF-E949-A1EF-F550A4FAE699}" type="datetimeFigureOut">
               <a:rPr lang="en-US" smtClean="0"/>
-              <a:t>1/10/24</a:t>
+              <a:t>1/11/24</a:t>
             </a:fld>
             <a:endParaRPr lang="en-US"/>
           </a:p>
@@ -6391,6 +6397,211 @@
           </a:p>
         </p:txBody>
       </p:sp>
+      <p:sp>
+        <p:nvSpPr>
+          <p:cNvPr id="2" name="TextBox 1">
+            <a:extLst>
+              <a:ext uri="{FF2B5EF4-FFF2-40B4-BE49-F238E27FC236}">
+                <a16:creationId xmlns:a16="http://schemas.microsoft.com/office/drawing/2014/main" id="{5D5B8A3B-4D79-77A3-D1C4-DDC32040F7D3}"/>
+              </a:ext>
+            </a:extLst>
+          </p:cNvPr>
+          <p:cNvSpPr txBox="1"/>
+          <p:nvPr/>
+        </p:nvSpPr>
+        <p:spPr>
+          <a:xfrm>
+            <a:off x="506738" y="3880127"/>
+            <a:ext cx="336550" cy="261610"/>
+          </a:xfrm>
+          <a:prstGeom prst="rect">
+            <a:avLst/>
+          </a:prstGeom>
+          <a:noFill/>
+        </p:spPr>
+        <p:txBody>
+          <a:bodyPr wrap="square" rtlCol="0">
+            <a:spAutoFit/>
+          </a:bodyPr>
+          <a:lstStyle/>
+          <a:p>
+            <a:pPr algn="ctr"/>
+            <a:r>
+              <a:rPr lang="en-US" sz="1100" dirty="0">
+                <a:solidFill>
+                  <a:srgbClr val="C00000"/>
+                </a:solidFill>
+              </a:rPr>
+              <a:t>93</a:t>
+            </a:r>
+          </a:p>
+        </p:txBody>
+      </p:sp>
+      <p:sp>
+        <p:nvSpPr>
+          <p:cNvPr id="3" name="TextBox 2">
+            <a:extLst>
+              <a:ext uri="{FF2B5EF4-FFF2-40B4-BE49-F238E27FC236}">
+                <a16:creationId xmlns:a16="http://schemas.microsoft.com/office/drawing/2014/main" id="{3277F3A4-B9BD-9399-5CE7-E71D515ED8B2}"/>
+              </a:ext>
+            </a:extLst>
+          </p:cNvPr>
+          <p:cNvSpPr txBox="1"/>
+          <p:nvPr/>
+        </p:nvSpPr>
+        <p:spPr>
+          <a:xfrm>
+            <a:off x="524358" y="4394697"/>
+            <a:ext cx="336550" cy="261610"/>
+          </a:xfrm>
+          <a:prstGeom prst="rect">
+            <a:avLst/>
+          </a:prstGeom>
+          <a:noFill/>
+        </p:spPr>
+        <p:txBody>
+          <a:bodyPr wrap="square" rtlCol="0">
+            <a:spAutoFit/>
+          </a:bodyPr>
+          <a:lstStyle/>
+          <a:p>
+            <a:pPr algn="ctr"/>
+            <a:r>
+              <a:rPr lang="en-US" sz="1100" dirty="0">
+                <a:solidFill>
+                  <a:srgbClr val="C00000"/>
+                </a:solidFill>
+              </a:rPr>
+              <a:t>94</a:t>
+            </a:r>
+          </a:p>
+        </p:txBody>
+      </p:sp>
+      <p:sp>
+        <p:nvSpPr>
+          <p:cNvPr id="4" name="TextBox 3">
+            <a:extLst>
+              <a:ext uri="{FF2B5EF4-FFF2-40B4-BE49-F238E27FC236}">
+                <a16:creationId xmlns:a16="http://schemas.microsoft.com/office/drawing/2014/main" id="{E7FFA7FE-E81D-38E5-F289-33E737DAEDCB}"/>
+              </a:ext>
+            </a:extLst>
+          </p:cNvPr>
+          <p:cNvSpPr txBox="1"/>
+          <p:nvPr/>
+        </p:nvSpPr>
+        <p:spPr>
+          <a:xfrm>
+            <a:off x="92005" y="4918659"/>
+            <a:ext cx="336550" cy="261610"/>
+          </a:xfrm>
+          <a:prstGeom prst="rect">
+            <a:avLst/>
+          </a:prstGeom>
+          <a:noFill/>
+        </p:spPr>
+        <p:txBody>
+          <a:bodyPr wrap="square" rtlCol="0">
+            <a:spAutoFit/>
+          </a:bodyPr>
+          <a:lstStyle/>
+          <a:p>
+            <a:pPr algn="ctr"/>
+            <a:r>
+              <a:rPr lang="en-US" sz="1100" dirty="0">
+                <a:solidFill>
+                  <a:srgbClr val="C00000"/>
+                </a:solidFill>
+              </a:rPr>
+              <a:t>95</a:t>
+            </a:r>
+          </a:p>
+        </p:txBody>
+      </p:sp>
+      <p:sp>
+        <p:nvSpPr>
+          <p:cNvPr id="83" name="TextBox 82">
+            <a:extLst>
+              <a:ext uri="{FF2B5EF4-FFF2-40B4-BE49-F238E27FC236}">
+                <a16:creationId xmlns:a16="http://schemas.microsoft.com/office/drawing/2014/main" id="{83879771-7D6A-F103-CBFB-AA8C3866993C}"/>
+              </a:ext>
+            </a:extLst>
+          </p:cNvPr>
+          <p:cNvSpPr txBox="1"/>
+          <p:nvPr/>
+        </p:nvSpPr>
+        <p:spPr>
+          <a:xfrm>
+            <a:off x="11277" y="5180269"/>
+            <a:ext cx="336550" cy="261610"/>
+          </a:xfrm>
+          <a:prstGeom prst="rect">
+            <a:avLst/>
+          </a:prstGeom>
+          <a:noFill/>
+        </p:spPr>
+        <p:txBody>
+          <a:bodyPr wrap="square" rtlCol="0">
+            <a:spAutoFit/>
+          </a:bodyPr>
+          <a:lstStyle/>
+          <a:p>
+            <a:pPr algn="ctr"/>
+            <a:r>
+              <a:rPr lang="en-US" sz="1100" dirty="0">
+                <a:solidFill>
+                  <a:srgbClr val="C00000"/>
+                </a:solidFill>
+              </a:rPr>
+              <a:t>96</a:t>
+            </a:r>
+          </a:p>
+        </p:txBody>
+      </p:sp>
+      <p:sp>
+        <p:nvSpPr>
+          <p:cNvPr id="85" name="TextBox 84">
+            <a:extLst>
+              <a:ext uri="{FF2B5EF4-FFF2-40B4-BE49-F238E27FC236}">
+                <a16:creationId xmlns:a16="http://schemas.microsoft.com/office/drawing/2014/main" id="{F2520561-D070-152B-55E3-F350BF1414EB}"/>
+              </a:ext>
+            </a:extLst>
+          </p:cNvPr>
+          <p:cNvSpPr txBox="1"/>
+          <p:nvPr/>
+        </p:nvSpPr>
+        <p:spPr>
+          <a:xfrm>
+            <a:off x="-7724" y="5649123"/>
+            <a:ext cx="336550" cy="261610"/>
+          </a:xfrm>
+          <a:prstGeom prst="rect">
+            <a:avLst/>
+          </a:prstGeom>
+          <a:noFill/>
+        </p:spPr>
+        <p:txBody>
+          <a:bodyPr wrap="square" rtlCol="0">
+            <a:spAutoFit/>
+          </a:bodyPr>
+          <a:lstStyle/>
+          <a:p>
+            <a:pPr algn="ctr"/>
+            <a:r>
+              <a:rPr lang="en-US" sz="1100">
+                <a:solidFill>
+                  <a:srgbClr val="C00000"/>
+                </a:solidFill>
+              </a:rPr>
+              <a:t>97</a:t>
+            </a:r>
+            <a:endParaRPr lang="en-US" sz="1100" dirty="0">
+              <a:solidFill>
+                <a:srgbClr val="C00000"/>
+              </a:solidFill>
+            </a:endParaRPr>
+          </a:p>
+        </p:txBody>
+      </p:sp>
     </p:spTree>
     <p:extLst>
       <p:ext uri="{BB962C8B-B14F-4D97-AF65-F5344CB8AC3E}">
@@ -6450,10 +6661,1269 @@
           </a:prstGeom>
         </p:spPr>
       </p:pic>
+      <p:sp>
+        <p:nvSpPr>
+          <p:cNvPr id="2" name="TextBox 1">
+            <a:extLst>
+              <a:ext uri="{FF2B5EF4-FFF2-40B4-BE49-F238E27FC236}">
+                <a16:creationId xmlns:a16="http://schemas.microsoft.com/office/drawing/2014/main" id="{35FF7D9F-C6E9-A416-4237-57F7E3A87EE9}"/>
+              </a:ext>
+            </a:extLst>
+          </p:cNvPr>
+          <p:cNvSpPr txBox="1"/>
+          <p:nvPr/>
+        </p:nvSpPr>
+        <p:spPr>
+          <a:xfrm>
+            <a:off x="119916" y="534454"/>
+            <a:ext cx="336550" cy="261610"/>
+          </a:xfrm>
+          <a:prstGeom prst="rect">
+            <a:avLst/>
+          </a:prstGeom>
+          <a:noFill/>
+        </p:spPr>
+        <p:txBody>
+          <a:bodyPr wrap="square" rtlCol="0">
+            <a:spAutoFit/>
+          </a:bodyPr>
+          <a:lstStyle/>
+          <a:p>
+            <a:pPr algn="ctr"/>
+            <a:r>
+              <a:rPr lang="en-US" sz="1100" dirty="0">
+                <a:solidFill>
+                  <a:srgbClr val="C00000"/>
+                </a:solidFill>
+              </a:rPr>
+              <a:t>36</a:t>
+            </a:r>
+          </a:p>
+        </p:txBody>
+      </p:sp>
+      <p:sp>
+        <p:nvSpPr>
+          <p:cNvPr id="3" name="TextBox 2">
+            <a:extLst>
+              <a:ext uri="{FF2B5EF4-FFF2-40B4-BE49-F238E27FC236}">
+                <a16:creationId xmlns:a16="http://schemas.microsoft.com/office/drawing/2014/main" id="{D8E9BEDD-CACA-F078-0EA6-049497FED3C4}"/>
+              </a:ext>
+            </a:extLst>
+          </p:cNvPr>
+          <p:cNvSpPr txBox="1"/>
+          <p:nvPr/>
+        </p:nvSpPr>
+        <p:spPr>
+          <a:xfrm>
+            <a:off x="422543" y="1192723"/>
+            <a:ext cx="336550" cy="261610"/>
+          </a:xfrm>
+          <a:prstGeom prst="rect">
+            <a:avLst/>
+          </a:prstGeom>
+          <a:noFill/>
+        </p:spPr>
+        <p:txBody>
+          <a:bodyPr wrap="square" rtlCol="0">
+            <a:spAutoFit/>
+          </a:bodyPr>
+          <a:lstStyle/>
+          <a:p>
+            <a:pPr algn="ctr"/>
+            <a:r>
+              <a:rPr lang="en-US" sz="1100" dirty="0">
+                <a:solidFill>
+                  <a:srgbClr val="C00000"/>
+                </a:solidFill>
+              </a:rPr>
+              <a:t>46</a:t>
+            </a:r>
+          </a:p>
+        </p:txBody>
+      </p:sp>
+      <p:sp>
+        <p:nvSpPr>
+          <p:cNvPr id="4" name="TextBox 3">
+            <a:extLst>
+              <a:ext uri="{FF2B5EF4-FFF2-40B4-BE49-F238E27FC236}">
+                <a16:creationId xmlns:a16="http://schemas.microsoft.com/office/drawing/2014/main" id="{30808FCF-2914-4563-C758-ADEF43722B7F}"/>
+              </a:ext>
+            </a:extLst>
+          </p:cNvPr>
+          <p:cNvSpPr txBox="1"/>
+          <p:nvPr/>
+        </p:nvSpPr>
+        <p:spPr>
+          <a:xfrm>
+            <a:off x="730541" y="1816702"/>
+            <a:ext cx="336550" cy="261610"/>
+          </a:xfrm>
+          <a:prstGeom prst="rect">
+            <a:avLst/>
+          </a:prstGeom>
+          <a:noFill/>
+        </p:spPr>
+        <p:txBody>
+          <a:bodyPr wrap="square" rtlCol="0">
+            <a:spAutoFit/>
+          </a:bodyPr>
+          <a:lstStyle/>
+          <a:p>
+            <a:pPr algn="ctr"/>
+            <a:r>
+              <a:rPr lang="en-US" sz="1100" dirty="0">
+                <a:solidFill>
+                  <a:srgbClr val="C00000"/>
+                </a:solidFill>
+              </a:rPr>
+              <a:t>55</a:t>
+            </a:r>
+          </a:p>
+        </p:txBody>
+      </p:sp>
+      <p:sp>
+        <p:nvSpPr>
+          <p:cNvPr id="5" name="TextBox 4">
+            <a:extLst>
+              <a:ext uri="{FF2B5EF4-FFF2-40B4-BE49-F238E27FC236}">
+                <a16:creationId xmlns:a16="http://schemas.microsoft.com/office/drawing/2014/main" id="{8395B5F4-866C-032B-BA06-15755EFEE9A2}"/>
+              </a:ext>
+            </a:extLst>
+          </p:cNvPr>
+          <p:cNvSpPr txBox="1"/>
+          <p:nvPr/>
+        </p:nvSpPr>
+        <p:spPr>
+          <a:xfrm>
+            <a:off x="1004925" y="2401031"/>
+            <a:ext cx="336550" cy="261610"/>
+          </a:xfrm>
+          <a:prstGeom prst="rect">
+            <a:avLst/>
+          </a:prstGeom>
+          <a:noFill/>
+        </p:spPr>
+        <p:txBody>
+          <a:bodyPr wrap="square" rtlCol="0">
+            <a:spAutoFit/>
+          </a:bodyPr>
+          <a:lstStyle/>
+          <a:p>
+            <a:pPr algn="ctr"/>
+            <a:r>
+              <a:rPr lang="en-US" sz="1100" dirty="0">
+                <a:solidFill>
+                  <a:srgbClr val="C00000"/>
+                </a:solidFill>
+              </a:rPr>
+              <a:t>62</a:t>
+            </a:r>
+          </a:p>
+        </p:txBody>
+      </p:sp>
+      <p:sp>
+        <p:nvSpPr>
+          <p:cNvPr id="6" name="TextBox 5">
+            <a:extLst>
+              <a:ext uri="{FF2B5EF4-FFF2-40B4-BE49-F238E27FC236}">
+                <a16:creationId xmlns:a16="http://schemas.microsoft.com/office/drawing/2014/main" id="{362AE12E-1D5F-C854-43E4-166E44A24349}"/>
+              </a:ext>
+            </a:extLst>
+          </p:cNvPr>
+          <p:cNvSpPr txBox="1"/>
+          <p:nvPr/>
+        </p:nvSpPr>
+        <p:spPr>
+          <a:xfrm>
+            <a:off x="1337557" y="3058165"/>
+            <a:ext cx="336550" cy="261610"/>
+          </a:xfrm>
+          <a:prstGeom prst="rect">
+            <a:avLst/>
+          </a:prstGeom>
+          <a:noFill/>
+        </p:spPr>
+        <p:txBody>
+          <a:bodyPr wrap="square" rtlCol="0">
+            <a:spAutoFit/>
+          </a:bodyPr>
+          <a:lstStyle/>
+          <a:p>
+            <a:pPr algn="ctr"/>
+            <a:r>
+              <a:rPr lang="en-US" sz="1100" dirty="0">
+                <a:solidFill>
+                  <a:srgbClr val="C00000"/>
+                </a:solidFill>
+              </a:rPr>
+              <a:t>67</a:t>
+            </a:r>
+          </a:p>
+        </p:txBody>
+      </p:sp>
+      <p:sp>
+        <p:nvSpPr>
+          <p:cNvPr id="7" name="TextBox 6">
+            <a:extLst>
+              <a:ext uri="{FF2B5EF4-FFF2-40B4-BE49-F238E27FC236}">
+                <a16:creationId xmlns:a16="http://schemas.microsoft.com/office/drawing/2014/main" id="{6247035D-EEA4-35FF-52BC-57FFBB897DB4}"/>
+              </a:ext>
+            </a:extLst>
+          </p:cNvPr>
+          <p:cNvSpPr txBox="1"/>
+          <p:nvPr/>
+        </p:nvSpPr>
+        <p:spPr>
+          <a:xfrm>
+            <a:off x="1665796" y="3689332"/>
+            <a:ext cx="336550" cy="261610"/>
+          </a:xfrm>
+          <a:prstGeom prst="rect">
+            <a:avLst/>
+          </a:prstGeom>
+          <a:noFill/>
+        </p:spPr>
+        <p:txBody>
+          <a:bodyPr wrap="square" rtlCol="0">
+            <a:spAutoFit/>
+          </a:bodyPr>
+          <a:lstStyle/>
+          <a:p>
+            <a:pPr algn="ctr"/>
+            <a:r>
+              <a:rPr lang="en-US" sz="1100" dirty="0">
+                <a:solidFill>
+                  <a:srgbClr val="C00000"/>
+                </a:solidFill>
+              </a:rPr>
+              <a:t>69</a:t>
+            </a:r>
+          </a:p>
+        </p:txBody>
+      </p:sp>
+      <p:sp>
+        <p:nvSpPr>
+          <p:cNvPr id="8" name="TextBox 7">
+            <a:extLst>
+              <a:ext uri="{FF2B5EF4-FFF2-40B4-BE49-F238E27FC236}">
+                <a16:creationId xmlns:a16="http://schemas.microsoft.com/office/drawing/2014/main" id="{D7E44885-231F-6B4B-EE65-6E8ECE539547}"/>
+              </a:ext>
+            </a:extLst>
+          </p:cNvPr>
+          <p:cNvSpPr txBox="1"/>
+          <p:nvPr/>
+        </p:nvSpPr>
+        <p:spPr>
+          <a:xfrm>
+            <a:off x="1946466" y="4339707"/>
+            <a:ext cx="336550" cy="261610"/>
+          </a:xfrm>
+          <a:prstGeom prst="rect">
+            <a:avLst/>
+          </a:prstGeom>
+          <a:noFill/>
+        </p:spPr>
+        <p:txBody>
+          <a:bodyPr wrap="square" rtlCol="0">
+            <a:spAutoFit/>
+          </a:bodyPr>
+          <a:lstStyle/>
+          <a:p>
+            <a:pPr algn="ctr"/>
+            <a:r>
+              <a:rPr lang="en-US" sz="1100" dirty="0">
+                <a:solidFill>
+                  <a:srgbClr val="C00000"/>
+                </a:solidFill>
+              </a:rPr>
+              <a:t>71</a:t>
+            </a:r>
+          </a:p>
+        </p:txBody>
+      </p:sp>
+      <p:sp>
+        <p:nvSpPr>
+          <p:cNvPr id="9" name="TextBox 8">
+            <a:extLst>
+              <a:ext uri="{FF2B5EF4-FFF2-40B4-BE49-F238E27FC236}">
+                <a16:creationId xmlns:a16="http://schemas.microsoft.com/office/drawing/2014/main" id="{BE209DBC-13DA-EE9C-1E8D-9D4DDCF5A018}"/>
+              </a:ext>
+            </a:extLst>
+          </p:cNvPr>
+          <p:cNvSpPr txBox="1"/>
+          <p:nvPr/>
+        </p:nvSpPr>
+        <p:spPr>
+          <a:xfrm>
+            <a:off x="2266843" y="4967346"/>
+            <a:ext cx="336550" cy="261610"/>
+          </a:xfrm>
+          <a:prstGeom prst="rect">
+            <a:avLst/>
+          </a:prstGeom>
+          <a:noFill/>
+        </p:spPr>
+        <p:txBody>
+          <a:bodyPr wrap="square" rtlCol="0">
+            <a:spAutoFit/>
+          </a:bodyPr>
+          <a:lstStyle/>
+          <a:p>
+            <a:pPr algn="ctr"/>
+            <a:r>
+              <a:rPr lang="en-US" sz="1100" dirty="0">
+                <a:solidFill>
+                  <a:srgbClr val="C00000"/>
+                </a:solidFill>
+              </a:rPr>
+              <a:t>73</a:t>
+            </a:r>
+          </a:p>
+        </p:txBody>
+      </p:sp>
+      <p:sp>
+        <p:nvSpPr>
+          <p:cNvPr id="11" name="TextBox 10">
+            <a:extLst>
+              <a:ext uri="{FF2B5EF4-FFF2-40B4-BE49-F238E27FC236}">
+                <a16:creationId xmlns:a16="http://schemas.microsoft.com/office/drawing/2014/main" id="{2B591496-60E7-2515-2EE3-6A2770C08DB0}"/>
+              </a:ext>
+            </a:extLst>
+          </p:cNvPr>
+          <p:cNvSpPr txBox="1"/>
+          <p:nvPr/>
+        </p:nvSpPr>
+        <p:spPr>
+          <a:xfrm>
+            <a:off x="83577" y="2874074"/>
+            <a:ext cx="336550" cy="261610"/>
+          </a:xfrm>
+          <a:prstGeom prst="rect">
+            <a:avLst/>
+          </a:prstGeom>
+          <a:noFill/>
+        </p:spPr>
+        <p:txBody>
+          <a:bodyPr wrap="square" rtlCol="0">
+            <a:spAutoFit/>
+          </a:bodyPr>
+          <a:lstStyle/>
+          <a:p>
+            <a:pPr algn="ctr"/>
+            <a:r>
+              <a:rPr lang="en-US" sz="1100" dirty="0">
+                <a:solidFill>
+                  <a:srgbClr val="C00000"/>
+                </a:solidFill>
+              </a:rPr>
+              <a:t>61</a:t>
+            </a:r>
+          </a:p>
+        </p:txBody>
+      </p:sp>
+      <p:sp>
+        <p:nvSpPr>
+          <p:cNvPr id="12" name="TextBox 11">
+            <a:extLst>
+              <a:ext uri="{FF2B5EF4-FFF2-40B4-BE49-F238E27FC236}">
+                <a16:creationId xmlns:a16="http://schemas.microsoft.com/office/drawing/2014/main" id="{D364A27D-6C4A-2F7B-A9F3-CD9079C6315A}"/>
+              </a:ext>
+            </a:extLst>
+          </p:cNvPr>
+          <p:cNvSpPr txBox="1"/>
+          <p:nvPr/>
+        </p:nvSpPr>
+        <p:spPr>
+          <a:xfrm>
+            <a:off x="-38055" y="3738821"/>
+            <a:ext cx="336550" cy="261610"/>
+          </a:xfrm>
+          <a:prstGeom prst="rect">
+            <a:avLst/>
+          </a:prstGeom>
+          <a:noFill/>
+        </p:spPr>
+        <p:txBody>
+          <a:bodyPr wrap="square" rtlCol="0">
+            <a:spAutoFit/>
+          </a:bodyPr>
+          <a:lstStyle/>
+          <a:p>
+            <a:pPr algn="ctr"/>
+            <a:r>
+              <a:rPr lang="en-US" sz="1100" dirty="0">
+                <a:solidFill>
+                  <a:srgbClr val="C00000"/>
+                </a:solidFill>
+              </a:rPr>
+              <a:t>66</a:t>
+            </a:r>
+          </a:p>
+        </p:txBody>
+      </p:sp>
+      <p:sp>
+        <p:nvSpPr>
+          <p:cNvPr id="13" name="TextBox 12">
+            <a:extLst>
+              <a:ext uri="{FF2B5EF4-FFF2-40B4-BE49-F238E27FC236}">
+                <a16:creationId xmlns:a16="http://schemas.microsoft.com/office/drawing/2014/main" id="{91AD7D51-B0C4-059A-1715-CDEC73F33DCD}"/>
+              </a:ext>
+            </a:extLst>
+          </p:cNvPr>
+          <p:cNvSpPr txBox="1"/>
+          <p:nvPr/>
+        </p:nvSpPr>
+        <p:spPr>
+          <a:xfrm>
+            <a:off x="264945" y="4367632"/>
+            <a:ext cx="336550" cy="261610"/>
+          </a:xfrm>
+          <a:prstGeom prst="rect">
+            <a:avLst/>
+          </a:prstGeom>
+          <a:noFill/>
+        </p:spPr>
+        <p:txBody>
+          <a:bodyPr wrap="square" rtlCol="0">
+            <a:spAutoFit/>
+          </a:bodyPr>
+          <a:lstStyle/>
+          <a:p>
+            <a:pPr algn="ctr"/>
+            <a:r>
+              <a:rPr lang="en-US" sz="1100" dirty="0">
+                <a:solidFill>
+                  <a:srgbClr val="C00000"/>
+                </a:solidFill>
+              </a:rPr>
+              <a:t>68</a:t>
+            </a:r>
+          </a:p>
+        </p:txBody>
+      </p:sp>
+      <p:sp>
+        <p:nvSpPr>
+          <p:cNvPr id="14" name="TextBox 13">
+            <a:extLst>
+              <a:ext uri="{FF2B5EF4-FFF2-40B4-BE49-F238E27FC236}">
+                <a16:creationId xmlns:a16="http://schemas.microsoft.com/office/drawing/2014/main" id="{55CDAA6E-8D53-00D2-DAAC-EC6C0ACF966C}"/>
+              </a:ext>
+            </a:extLst>
+          </p:cNvPr>
+          <p:cNvSpPr txBox="1"/>
+          <p:nvPr/>
+        </p:nvSpPr>
+        <p:spPr>
+          <a:xfrm>
+            <a:off x="595824" y="5030807"/>
+            <a:ext cx="336550" cy="261610"/>
+          </a:xfrm>
+          <a:prstGeom prst="rect">
+            <a:avLst/>
+          </a:prstGeom>
+          <a:noFill/>
+        </p:spPr>
+        <p:txBody>
+          <a:bodyPr wrap="square" rtlCol="0">
+            <a:spAutoFit/>
+          </a:bodyPr>
+          <a:lstStyle/>
+          <a:p>
+            <a:pPr algn="ctr"/>
+            <a:r>
+              <a:rPr lang="en-US" sz="1100" dirty="0">
+                <a:solidFill>
+                  <a:srgbClr val="C00000"/>
+                </a:solidFill>
+              </a:rPr>
+              <a:t>70</a:t>
+            </a:r>
+          </a:p>
+        </p:txBody>
+      </p:sp>
+      <p:sp>
+        <p:nvSpPr>
+          <p:cNvPr id="15" name="TextBox 14">
+            <a:extLst>
+              <a:ext uri="{FF2B5EF4-FFF2-40B4-BE49-F238E27FC236}">
+                <a16:creationId xmlns:a16="http://schemas.microsoft.com/office/drawing/2014/main" id="{B61DF126-C6A8-2D71-1CCB-22BF679AACF2}"/>
+              </a:ext>
+            </a:extLst>
+          </p:cNvPr>
+          <p:cNvSpPr txBox="1"/>
+          <p:nvPr/>
+        </p:nvSpPr>
+        <p:spPr>
+          <a:xfrm>
+            <a:off x="911092" y="5597109"/>
+            <a:ext cx="336550" cy="261610"/>
+          </a:xfrm>
+          <a:prstGeom prst="rect">
+            <a:avLst/>
+          </a:prstGeom>
+          <a:noFill/>
+        </p:spPr>
+        <p:txBody>
+          <a:bodyPr wrap="square" rtlCol="0">
+            <a:spAutoFit/>
+          </a:bodyPr>
+          <a:lstStyle/>
+          <a:p>
+            <a:pPr algn="ctr"/>
+            <a:r>
+              <a:rPr lang="en-US" sz="1100" dirty="0">
+                <a:solidFill>
+                  <a:srgbClr val="C00000"/>
+                </a:solidFill>
+              </a:rPr>
+              <a:t>72</a:t>
+            </a:r>
+          </a:p>
+        </p:txBody>
+      </p:sp>
+      <p:sp>
+        <p:nvSpPr>
+          <p:cNvPr id="16" name="TextBox 15">
+            <a:extLst>
+              <a:ext uri="{FF2B5EF4-FFF2-40B4-BE49-F238E27FC236}">
+                <a16:creationId xmlns:a16="http://schemas.microsoft.com/office/drawing/2014/main" id="{79F46525-4500-DED7-1170-3C5C45372191}"/>
+              </a:ext>
+            </a:extLst>
+          </p:cNvPr>
+          <p:cNvSpPr txBox="1"/>
+          <p:nvPr/>
+        </p:nvSpPr>
+        <p:spPr>
+          <a:xfrm>
+            <a:off x="5551063" y="3410308"/>
+            <a:ext cx="336550" cy="261610"/>
+          </a:xfrm>
+          <a:prstGeom prst="rect">
+            <a:avLst/>
+          </a:prstGeom>
+          <a:noFill/>
+        </p:spPr>
+        <p:txBody>
+          <a:bodyPr wrap="square" rtlCol="0">
+            <a:spAutoFit/>
+          </a:bodyPr>
+          <a:lstStyle/>
+          <a:p>
+            <a:pPr algn="ctr"/>
+            <a:r>
+              <a:rPr lang="en-US" sz="1100" dirty="0">
+                <a:solidFill>
+                  <a:srgbClr val="C00000"/>
+                </a:solidFill>
+              </a:rPr>
+              <a:t>81</a:t>
+            </a:r>
+          </a:p>
+        </p:txBody>
+      </p:sp>
+      <p:sp>
+        <p:nvSpPr>
+          <p:cNvPr id="17" name="TextBox 16">
+            <a:extLst>
+              <a:ext uri="{FF2B5EF4-FFF2-40B4-BE49-F238E27FC236}">
+                <a16:creationId xmlns:a16="http://schemas.microsoft.com/office/drawing/2014/main" id="{50A38E88-32EF-2E74-2F40-F160724967A2}"/>
+              </a:ext>
+            </a:extLst>
+          </p:cNvPr>
+          <p:cNvSpPr txBox="1"/>
+          <p:nvPr/>
+        </p:nvSpPr>
+        <p:spPr>
+          <a:xfrm>
+            <a:off x="6823603" y="5861607"/>
+            <a:ext cx="336550" cy="261610"/>
+          </a:xfrm>
+          <a:prstGeom prst="rect">
+            <a:avLst/>
+          </a:prstGeom>
+          <a:noFill/>
+        </p:spPr>
+        <p:txBody>
+          <a:bodyPr wrap="square" rtlCol="0">
+            <a:spAutoFit/>
+          </a:bodyPr>
+          <a:lstStyle/>
+          <a:p>
+            <a:pPr algn="ctr"/>
+            <a:r>
+              <a:rPr lang="en-US" sz="1100" dirty="0">
+                <a:solidFill>
+                  <a:srgbClr val="C00000"/>
+                </a:solidFill>
+              </a:rPr>
+              <a:t>82</a:t>
+            </a:r>
+          </a:p>
+        </p:txBody>
+      </p:sp>
+      <p:sp>
+        <p:nvSpPr>
+          <p:cNvPr id="18" name="TextBox 17">
+            <a:extLst>
+              <a:ext uri="{FF2B5EF4-FFF2-40B4-BE49-F238E27FC236}">
+                <a16:creationId xmlns:a16="http://schemas.microsoft.com/office/drawing/2014/main" id="{F4FA9A10-F727-184D-481E-2642ADE18892}"/>
+              </a:ext>
+            </a:extLst>
+          </p:cNvPr>
+          <p:cNvSpPr txBox="1"/>
+          <p:nvPr/>
+        </p:nvSpPr>
+        <p:spPr>
+          <a:xfrm>
+            <a:off x="10873633" y="3616183"/>
+            <a:ext cx="336550" cy="261610"/>
+          </a:xfrm>
+          <a:prstGeom prst="rect">
+            <a:avLst/>
+          </a:prstGeom>
+          <a:noFill/>
+        </p:spPr>
+        <p:txBody>
+          <a:bodyPr wrap="square" rtlCol="0">
+            <a:spAutoFit/>
+          </a:bodyPr>
+          <a:lstStyle/>
+          <a:p>
+            <a:pPr algn="ctr"/>
+            <a:r>
+              <a:rPr lang="en-US" sz="1100" dirty="0">
+                <a:solidFill>
+                  <a:srgbClr val="C00000"/>
+                </a:solidFill>
+              </a:rPr>
+              <a:t>83</a:t>
+            </a:r>
+          </a:p>
+        </p:txBody>
+      </p:sp>
+      <p:sp>
+        <p:nvSpPr>
+          <p:cNvPr id="19" name="TextBox 18">
+            <a:extLst>
+              <a:ext uri="{FF2B5EF4-FFF2-40B4-BE49-F238E27FC236}">
+                <a16:creationId xmlns:a16="http://schemas.microsoft.com/office/drawing/2014/main" id="{C9D3D429-B5B7-A0C8-6487-8169B6AD4AEC}"/>
+              </a:ext>
+            </a:extLst>
+          </p:cNvPr>
+          <p:cNvSpPr txBox="1"/>
+          <p:nvPr/>
+        </p:nvSpPr>
+        <p:spPr>
+          <a:xfrm>
+            <a:off x="2328736" y="1039058"/>
+            <a:ext cx="336550" cy="261610"/>
+          </a:xfrm>
+          <a:prstGeom prst="rect">
+            <a:avLst/>
+          </a:prstGeom>
+          <a:noFill/>
+        </p:spPr>
+        <p:txBody>
+          <a:bodyPr wrap="square" rtlCol="0">
+            <a:spAutoFit/>
+          </a:bodyPr>
+          <a:lstStyle/>
+          <a:p>
+            <a:pPr algn="ctr"/>
+            <a:r>
+              <a:rPr lang="en-US" sz="1100" dirty="0">
+                <a:solidFill>
+                  <a:srgbClr val="C00000"/>
+                </a:solidFill>
+              </a:rPr>
+              <a:t>77</a:t>
+            </a:r>
+          </a:p>
+        </p:txBody>
+      </p:sp>
+      <p:sp>
+        <p:nvSpPr>
+          <p:cNvPr id="20" name="TextBox 19">
+            <a:extLst>
+              <a:ext uri="{FF2B5EF4-FFF2-40B4-BE49-F238E27FC236}">
+                <a16:creationId xmlns:a16="http://schemas.microsoft.com/office/drawing/2014/main" id="{D8B32EDC-87B2-3EF2-BA0F-EFB77E187B5B}"/>
+              </a:ext>
+            </a:extLst>
+          </p:cNvPr>
+          <p:cNvSpPr txBox="1"/>
+          <p:nvPr/>
+        </p:nvSpPr>
+        <p:spPr>
+          <a:xfrm>
+            <a:off x="2676716" y="1600812"/>
+            <a:ext cx="336550" cy="261610"/>
+          </a:xfrm>
+          <a:prstGeom prst="rect">
+            <a:avLst/>
+          </a:prstGeom>
+          <a:noFill/>
+        </p:spPr>
+        <p:txBody>
+          <a:bodyPr wrap="square" rtlCol="0">
+            <a:spAutoFit/>
+          </a:bodyPr>
+          <a:lstStyle/>
+          <a:p>
+            <a:pPr algn="ctr"/>
+            <a:r>
+              <a:rPr lang="en-US" sz="1100" dirty="0">
+                <a:solidFill>
+                  <a:srgbClr val="C00000"/>
+                </a:solidFill>
+              </a:rPr>
+              <a:t>78</a:t>
+            </a:r>
+          </a:p>
+        </p:txBody>
+      </p:sp>
+      <p:sp>
+        <p:nvSpPr>
+          <p:cNvPr id="21" name="TextBox 20">
+            <a:extLst>
+              <a:ext uri="{FF2B5EF4-FFF2-40B4-BE49-F238E27FC236}">
+                <a16:creationId xmlns:a16="http://schemas.microsoft.com/office/drawing/2014/main" id="{A8B1ABC8-C1E4-E7A3-42C2-631AFCF1C253}"/>
+              </a:ext>
+            </a:extLst>
+          </p:cNvPr>
+          <p:cNvSpPr txBox="1"/>
+          <p:nvPr/>
+        </p:nvSpPr>
+        <p:spPr>
+          <a:xfrm>
+            <a:off x="3013266" y="2246698"/>
+            <a:ext cx="336550" cy="261610"/>
+          </a:xfrm>
+          <a:prstGeom prst="rect">
+            <a:avLst/>
+          </a:prstGeom>
+          <a:noFill/>
+        </p:spPr>
+        <p:txBody>
+          <a:bodyPr wrap="square" rtlCol="0">
+            <a:spAutoFit/>
+          </a:bodyPr>
+          <a:lstStyle/>
+          <a:p>
+            <a:pPr algn="ctr"/>
+            <a:r>
+              <a:rPr lang="en-US" sz="1100" dirty="0">
+                <a:solidFill>
+                  <a:srgbClr val="C00000"/>
+                </a:solidFill>
+              </a:rPr>
+              <a:t>79</a:t>
+            </a:r>
+          </a:p>
+        </p:txBody>
+      </p:sp>
+      <p:sp>
+        <p:nvSpPr>
+          <p:cNvPr id="22" name="TextBox 21">
+            <a:extLst>
+              <a:ext uri="{FF2B5EF4-FFF2-40B4-BE49-F238E27FC236}">
+                <a16:creationId xmlns:a16="http://schemas.microsoft.com/office/drawing/2014/main" id="{D1430DFD-B29F-D716-71C4-2B2D716AFE21}"/>
+              </a:ext>
+            </a:extLst>
+          </p:cNvPr>
+          <p:cNvSpPr txBox="1"/>
+          <p:nvPr/>
+        </p:nvSpPr>
+        <p:spPr>
+          <a:xfrm>
+            <a:off x="3292666" y="2845590"/>
+            <a:ext cx="336550" cy="261610"/>
+          </a:xfrm>
+          <a:prstGeom prst="rect">
+            <a:avLst/>
+          </a:prstGeom>
+          <a:noFill/>
+        </p:spPr>
+        <p:txBody>
+          <a:bodyPr wrap="square" rtlCol="0">
+            <a:spAutoFit/>
+          </a:bodyPr>
+          <a:lstStyle/>
+          <a:p>
+            <a:pPr algn="ctr"/>
+            <a:r>
+              <a:rPr lang="en-US" sz="1100" dirty="0">
+                <a:solidFill>
+                  <a:srgbClr val="C00000"/>
+                </a:solidFill>
+              </a:rPr>
+              <a:t>80</a:t>
+            </a:r>
+          </a:p>
+        </p:txBody>
+      </p:sp>
+      <p:sp>
+        <p:nvSpPr>
+          <p:cNvPr id="23" name="TextBox 22">
+            <a:extLst>
+              <a:ext uri="{FF2B5EF4-FFF2-40B4-BE49-F238E27FC236}">
+                <a16:creationId xmlns:a16="http://schemas.microsoft.com/office/drawing/2014/main" id="{D9C15C9D-6DB2-8CE8-D87A-556F8A2F8C28}"/>
+              </a:ext>
+            </a:extLst>
+          </p:cNvPr>
+          <p:cNvSpPr txBox="1"/>
+          <p:nvPr/>
+        </p:nvSpPr>
+        <p:spPr>
+          <a:xfrm>
+            <a:off x="11563243" y="4769197"/>
+            <a:ext cx="336550" cy="261610"/>
+          </a:xfrm>
+          <a:prstGeom prst="rect">
+            <a:avLst/>
+          </a:prstGeom>
+          <a:noFill/>
+        </p:spPr>
+        <p:txBody>
+          <a:bodyPr wrap="square" rtlCol="0">
+            <a:spAutoFit/>
+          </a:bodyPr>
+          <a:lstStyle/>
+          <a:p>
+            <a:pPr algn="ctr"/>
+            <a:r>
+              <a:rPr lang="en-US" sz="1100" dirty="0">
+                <a:solidFill>
+                  <a:srgbClr val="C00000"/>
+                </a:solidFill>
+              </a:rPr>
+              <a:t>84</a:t>
+            </a:r>
+          </a:p>
+        </p:txBody>
+      </p:sp>
     </p:spTree>
     <p:extLst>
       <p:ext uri="{BB962C8B-B14F-4D97-AF65-F5344CB8AC3E}">
         <p14:creationId xmlns:p14="http://schemas.microsoft.com/office/powerpoint/2010/main" val="1922835032"/>
+      </p:ext>
+    </p:extLst>
+  </p:cSld>
+  <p:clrMapOvr>
+    <a:masterClrMapping/>
+  </p:clrMapOvr>
+</p:sld>
+</file>
+
+<file path=ppt/slides/slide3.xml><?xml version="1.0" encoding="utf-8"?>
+<p:sld xmlns:a="http://schemas.openxmlformats.org/drawingml/2006/main" xmlns:r="http://schemas.openxmlformats.org/officeDocument/2006/relationships" xmlns:p="http://schemas.openxmlformats.org/presentationml/2006/main">
+  <p:cSld>
+    <p:spTree>
+      <p:nvGrpSpPr>
+        <p:cNvPr id="1" name=""/>
+        <p:cNvGrpSpPr/>
+        <p:nvPr/>
+      </p:nvGrpSpPr>
+      <p:grpSpPr>
+        <a:xfrm>
+          <a:off x="0" y="0"/>
+          <a:ext cx="0" cy="0"/>
+          <a:chOff x="0" y="0"/>
+          <a:chExt cx="0" cy="0"/>
+        </a:xfrm>
+      </p:grpSpPr>
+      <p:pic>
+        <p:nvPicPr>
+          <p:cNvPr id="5" name="Picture 4">
+            <a:extLst>
+              <a:ext uri="{FF2B5EF4-FFF2-40B4-BE49-F238E27FC236}">
+                <a16:creationId xmlns:a16="http://schemas.microsoft.com/office/drawing/2014/main" id="{570B6A35-207C-C93D-B526-080320C8661F}"/>
+              </a:ext>
+            </a:extLst>
+          </p:cNvPr>
+          <p:cNvPicPr>
+            <a:picLocks noChangeAspect="1"/>
+          </p:cNvPicPr>
+          <p:nvPr/>
+        </p:nvPicPr>
+        <p:blipFill rotWithShape="1">
+          <a:blip r:embed="rId2"/>
+          <a:srcRect t="15771"/>
+          <a:stretch/>
+        </p:blipFill>
+        <p:spPr>
+          <a:xfrm>
+            <a:off x="-1" y="242888"/>
+            <a:ext cx="12192669" cy="6418515"/>
+          </a:xfrm>
+          <a:prstGeom prst="rect">
+            <a:avLst/>
+          </a:prstGeom>
+        </p:spPr>
+      </p:pic>
+      <p:sp>
+        <p:nvSpPr>
+          <p:cNvPr id="6" name="TextBox 5">
+            <a:extLst>
+              <a:ext uri="{FF2B5EF4-FFF2-40B4-BE49-F238E27FC236}">
+                <a16:creationId xmlns:a16="http://schemas.microsoft.com/office/drawing/2014/main" id="{4BB3B789-021F-8ADD-5A7B-DA4EAFD57CE2}"/>
+              </a:ext>
+            </a:extLst>
+          </p:cNvPr>
+          <p:cNvSpPr txBox="1"/>
+          <p:nvPr/>
+        </p:nvSpPr>
+        <p:spPr>
+          <a:xfrm>
+            <a:off x="2206110" y="6314309"/>
+            <a:ext cx="336550" cy="261610"/>
+          </a:xfrm>
+          <a:prstGeom prst="rect">
+            <a:avLst/>
+          </a:prstGeom>
+          <a:noFill/>
+        </p:spPr>
+        <p:txBody>
+          <a:bodyPr wrap="square" rtlCol="0">
+            <a:spAutoFit/>
+          </a:bodyPr>
+          <a:lstStyle/>
+          <a:p>
+            <a:pPr algn="ctr"/>
+            <a:r>
+              <a:rPr lang="en-US" sz="1100" dirty="0">
+                <a:solidFill>
+                  <a:srgbClr val="C00000"/>
+                </a:solidFill>
+              </a:rPr>
+              <a:t>11</a:t>
+            </a:r>
+          </a:p>
+        </p:txBody>
+      </p:sp>
+      <p:sp>
+        <p:nvSpPr>
+          <p:cNvPr id="7" name="TextBox 6">
+            <a:extLst>
+              <a:ext uri="{FF2B5EF4-FFF2-40B4-BE49-F238E27FC236}">
+                <a16:creationId xmlns:a16="http://schemas.microsoft.com/office/drawing/2014/main" id="{65124B0C-281C-7DC2-78E7-6CC187026BF7}"/>
+              </a:ext>
+            </a:extLst>
+          </p:cNvPr>
+          <p:cNvSpPr txBox="1"/>
+          <p:nvPr/>
+        </p:nvSpPr>
+        <p:spPr>
+          <a:xfrm>
+            <a:off x="1729860" y="5366572"/>
+            <a:ext cx="336550" cy="261610"/>
+          </a:xfrm>
+          <a:prstGeom prst="rect">
+            <a:avLst/>
+          </a:prstGeom>
+          <a:noFill/>
+        </p:spPr>
+        <p:txBody>
+          <a:bodyPr wrap="square" rtlCol="0">
+            <a:spAutoFit/>
+          </a:bodyPr>
+          <a:lstStyle/>
+          <a:p>
+            <a:pPr algn="ctr"/>
+            <a:r>
+              <a:rPr lang="en-US" sz="1100" dirty="0">
+                <a:solidFill>
+                  <a:srgbClr val="C00000"/>
+                </a:solidFill>
+              </a:rPr>
+              <a:t>91</a:t>
+            </a:r>
+          </a:p>
+        </p:txBody>
+      </p:sp>
+      <p:sp>
+        <p:nvSpPr>
+          <p:cNvPr id="8" name="TextBox 7">
+            <a:extLst>
+              <a:ext uri="{FF2B5EF4-FFF2-40B4-BE49-F238E27FC236}">
+                <a16:creationId xmlns:a16="http://schemas.microsoft.com/office/drawing/2014/main" id="{8BCA7334-7E1E-956B-EC89-82E982F5E179}"/>
+              </a:ext>
+            </a:extLst>
+          </p:cNvPr>
+          <p:cNvSpPr txBox="1"/>
+          <p:nvPr/>
+        </p:nvSpPr>
+        <p:spPr>
+          <a:xfrm>
+            <a:off x="7840150" y="6124136"/>
+            <a:ext cx="336550" cy="261610"/>
+          </a:xfrm>
+          <a:prstGeom prst="rect">
+            <a:avLst/>
+          </a:prstGeom>
+          <a:noFill/>
+        </p:spPr>
+        <p:txBody>
+          <a:bodyPr wrap="square" rtlCol="0">
+            <a:spAutoFit/>
+          </a:bodyPr>
+          <a:lstStyle/>
+          <a:p>
+            <a:pPr algn="ctr"/>
+            <a:r>
+              <a:rPr lang="en-US" sz="1100" dirty="0">
+                <a:solidFill>
+                  <a:srgbClr val="C00000"/>
+                </a:solidFill>
+              </a:rPr>
+              <a:t>85</a:t>
+            </a:r>
+          </a:p>
+        </p:txBody>
+      </p:sp>
+      <p:sp>
+        <p:nvSpPr>
+          <p:cNvPr id="9" name="TextBox 8">
+            <a:extLst>
+              <a:ext uri="{FF2B5EF4-FFF2-40B4-BE49-F238E27FC236}">
+                <a16:creationId xmlns:a16="http://schemas.microsoft.com/office/drawing/2014/main" id="{CFB34BF3-DEBA-8B9C-0CE2-AE3C1DD5AF04}"/>
+              </a:ext>
+            </a:extLst>
+          </p:cNvPr>
+          <p:cNvSpPr txBox="1"/>
+          <p:nvPr/>
+        </p:nvSpPr>
+        <p:spPr>
+          <a:xfrm>
+            <a:off x="7335325" y="4919224"/>
+            <a:ext cx="336550" cy="261610"/>
+          </a:xfrm>
+          <a:prstGeom prst="rect">
+            <a:avLst/>
+          </a:prstGeom>
+          <a:noFill/>
+        </p:spPr>
+        <p:txBody>
+          <a:bodyPr wrap="square" rtlCol="0">
+            <a:spAutoFit/>
+          </a:bodyPr>
+          <a:lstStyle/>
+          <a:p>
+            <a:pPr algn="ctr"/>
+            <a:r>
+              <a:rPr lang="en-US" sz="1100" dirty="0">
+                <a:solidFill>
+                  <a:srgbClr val="C00000"/>
+                </a:solidFill>
+              </a:rPr>
+              <a:t>86</a:t>
+            </a:r>
+          </a:p>
+        </p:txBody>
+      </p:sp>
+      <p:sp>
+        <p:nvSpPr>
+          <p:cNvPr id="10" name="TextBox 9">
+            <a:extLst>
+              <a:ext uri="{FF2B5EF4-FFF2-40B4-BE49-F238E27FC236}">
+                <a16:creationId xmlns:a16="http://schemas.microsoft.com/office/drawing/2014/main" id="{9995F725-7F03-CD45-2DC3-905B2C88D73D}"/>
+              </a:ext>
+            </a:extLst>
+          </p:cNvPr>
+          <p:cNvSpPr txBox="1"/>
+          <p:nvPr/>
+        </p:nvSpPr>
+        <p:spPr>
+          <a:xfrm>
+            <a:off x="6678100" y="3406681"/>
+            <a:ext cx="336550" cy="261610"/>
+          </a:xfrm>
+          <a:prstGeom prst="rect">
+            <a:avLst/>
+          </a:prstGeom>
+          <a:noFill/>
+        </p:spPr>
+        <p:txBody>
+          <a:bodyPr wrap="square" rtlCol="0">
+            <a:spAutoFit/>
+          </a:bodyPr>
+          <a:lstStyle/>
+          <a:p>
+            <a:pPr algn="ctr"/>
+            <a:r>
+              <a:rPr lang="en-US" sz="1100" dirty="0">
+                <a:solidFill>
+                  <a:srgbClr val="C00000"/>
+                </a:solidFill>
+              </a:rPr>
+              <a:t>87</a:t>
+            </a:r>
+          </a:p>
+        </p:txBody>
+      </p:sp>
+      <p:sp>
+        <p:nvSpPr>
+          <p:cNvPr id="11" name="TextBox 10">
+            <a:extLst>
+              <a:ext uri="{FF2B5EF4-FFF2-40B4-BE49-F238E27FC236}">
+                <a16:creationId xmlns:a16="http://schemas.microsoft.com/office/drawing/2014/main" id="{EF3D9229-4F5A-86C6-C7E5-FA91936E0B6C}"/>
+              </a:ext>
+            </a:extLst>
+          </p:cNvPr>
+          <p:cNvSpPr txBox="1"/>
+          <p:nvPr/>
+        </p:nvSpPr>
+        <p:spPr>
+          <a:xfrm>
+            <a:off x="6947201" y="508606"/>
+            <a:ext cx="336550" cy="261610"/>
+          </a:xfrm>
+          <a:prstGeom prst="rect">
+            <a:avLst/>
+          </a:prstGeom>
+          <a:noFill/>
+        </p:spPr>
+        <p:txBody>
+          <a:bodyPr wrap="square" rtlCol="0">
+            <a:spAutoFit/>
+          </a:bodyPr>
+          <a:lstStyle/>
+          <a:p>
+            <a:pPr algn="ctr"/>
+            <a:r>
+              <a:rPr lang="en-US" sz="1100" dirty="0">
+                <a:solidFill>
+                  <a:srgbClr val="C00000"/>
+                </a:solidFill>
+              </a:rPr>
+              <a:t>88</a:t>
+            </a:r>
+          </a:p>
+        </p:txBody>
+      </p:sp>
+      <p:sp>
+        <p:nvSpPr>
+          <p:cNvPr id="12" name="TextBox 11">
+            <a:extLst>
+              <a:ext uri="{FF2B5EF4-FFF2-40B4-BE49-F238E27FC236}">
+                <a16:creationId xmlns:a16="http://schemas.microsoft.com/office/drawing/2014/main" id="{E8975941-F392-9AAF-60CB-B5A6FC96B77F}"/>
+              </a:ext>
+            </a:extLst>
+          </p:cNvPr>
+          <p:cNvSpPr txBox="1"/>
+          <p:nvPr/>
+        </p:nvSpPr>
+        <p:spPr>
+          <a:xfrm>
+            <a:off x="6731663" y="413569"/>
+            <a:ext cx="336550" cy="261610"/>
+          </a:xfrm>
+          <a:prstGeom prst="rect">
+            <a:avLst/>
+          </a:prstGeom>
+          <a:noFill/>
+        </p:spPr>
+        <p:txBody>
+          <a:bodyPr wrap="square" rtlCol="0">
+            <a:spAutoFit/>
+          </a:bodyPr>
+          <a:lstStyle/>
+          <a:p>
+            <a:pPr algn="ctr"/>
+            <a:r>
+              <a:rPr lang="en-US" sz="1100" dirty="0">
+                <a:solidFill>
+                  <a:srgbClr val="C00000"/>
+                </a:solidFill>
+              </a:rPr>
+              <a:t>89</a:t>
+            </a:r>
+          </a:p>
+        </p:txBody>
+      </p:sp>
+      <p:sp>
+        <p:nvSpPr>
+          <p:cNvPr id="13" name="TextBox 12">
+            <a:extLst>
+              <a:ext uri="{FF2B5EF4-FFF2-40B4-BE49-F238E27FC236}">
+                <a16:creationId xmlns:a16="http://schemas.microsoft.com/office/drawing/2014/main" id="{7C20BFAD-FCE7-9B64-1C86-E2F7CD3B91CA}"/>
+              </a:ext>
+            </a:extLst>
+          </p:cNvPr>
+          <p:cNvSpPr txBox="1"/>
+          <p:nvPr/>
+        </p:nvSpPr>
+        <p:spPr>
+          <a:xfrm>
+            <a:off x="6959901" y="224878"/>
+            <a:ext cx="336550" cy="261610"/>
+          </a:xfrm>
+          <a:prstGeom prst="rect">
+            <a:avLst/>
+          </a:prstGeom>
+          <a:noFill/>
+        </p:spPr>
+        <p:txBody>
+          <a:bodyPr wrap="square" rtlCol="0">
+            <a:spAutoFit/>
+          </a:bodyPr>
+          <a:lstStyle/>
+          <a:p>
+            <a:pPr algn="ctr"/>
+            <a:r>
+              <a:rPr lang="en-US" sz="1100" dirty="0">
+                <a:solidFill>
+                  <a:srgbClr val="C00000"/>
+                </a:solidFill>
+              </a:rPr>
+              <a:t>90</a:t>
+            </a:r>
+          </a:p>
+        </p:txBody>
+      </p:sp>
+      <p:sp>
+        <p:nvSpPr>
+          <p:cNvPr id="14" name="TextBox 13">
+            <a:extLst>
+              <a:ext uri="{FF2B5EF4-FFF2-40B4-BE49-F238E27FC236}">
+                <a16:creationId xmlns:a16="http://schemas.microsoft.com/office/drawing/2014/main" id="{8F2A3163-593B-FDA6-37EA-E90DAC0249D1}"/>
+              </a:ext>
+            </a:extLst>
+          </p:cNvPr>
+          <p:cNvSpPr txBox="1"/>
+          <p:nvPr/>
+        </p:nvSpPr>
+        <p:spPr>
+          <a:xfrm>
+            <a:off x="2936360" y="4261672"/>
+            <a:ext cx="336550" cy="261610"/>
+          </a:xfrm>
+          <a:prstGeom prst="rect">
+            <a:avLst/>
+          </a:prstGeom>
+          <a:noFill/>
+        </p:spPr>
+        <p:txBody>
+          <a:bodyPr wrap="square" rtlCol="0">
+            <a:spAutoFit/>
+          </a:bodyPr>
+          <a:lstStyle/>
+          <a:p>
+            <a:pPr algn="ctr"/>
+            <a:r>
+              <a:rPr lang="en-US" sz="1100" dirty="0">
+                <a:solidFill>
+                  <a:srgbClr val="C00000"/>
+                </a:solidFill>
+              </a:rPr>
+              <a:t>92</a:t>
+            </a:r>
+          </a:p>
+        </p:txBody>
+      </p:sp>
+    </p:spTree>
+    <p:extLst>
+      <p:ext uri="{BB962C8B-B14F-4D97-AF65-F5344CB8AC3E}">
+        <p14:creationId xmlns:p14="http://schemas.microsoft.com/office/powerpoint/2010/main" val="2965033332"/>
       </p:ext>
     </p:extLst>
   </p:cSld>

</xml_diff>